<commit_message>
presentacion pp mas chida
</commit_message>
<xml_diff>
--- a/tarea/Spotify.pptx
+++ b/tarea/Spotify.pptx
@@ -5,13 +5,13 @@
     <p:sldMasterId id="2147483648" r:id="rId1"/>
   </p:sldMasterIdLst>
   <p:sldIdLst>
-    <p:sldId id="256" r:id="rId3"/>
-    <p:sldId id="258" r:id="rId4"/>
-    <p:sldId id="257" r:id="rId5"/>
-    <p:sldId id="260" r:id="rId6"/>
-    <p:sldId id="259" r:id="rId7"/>
-    <p:sldId id="261" r:id="rId8"/>
-    <p:sldId id="262" r:id="rId9"/>
+    <p:sldId id="256" r:id="rId2"/>
+    <p:sldId id="258" r:id="rId3"/>
+    <p:sldId id="257" r:id="rId4"/>
+    <p:sldId id="260" r:id="rId5"/>
+    <p:sldId id="259" r:id="rId6"/>
+    <p:sldId id="261" r:id="rId7"/>
+    <p:sldId id="262" r:id="rId8"/>
   </p:sldIdLst>
   <p:sldSz cx="12192000" cy="6858000"/>
   <p:notesSz cx="6858000" cy="9144000"/>
@@ -110,11 +110,16 @@
       </a:defRPr>
     </a:lvl9pPr>
   </p:defaultTextStyle>
+  <p:extLst>
+    <p:ext uri="{EFAFB233-063F-42B5-8137-9DF3F51BA10A}">
+      <p15:sldGuideLst xmlns:p15="http://schemas.microsoft.com/office/powerpoint/2012/main"/>
+    </p:ext>
+  </p:extLst>
 </p:presentation>
 </file>
 
 <file path=ppt/slideLayouts/slideLayout1.xml><?xml version="1.0" encoding="utf-8"?>
-<p:sldLayout xmlns:a="http://schemas.openxmlformats.org/drawingml/2006/main" xmlns:r="http://schemas.openxmlformats.org/officeDocument/2006/relationships" xmlns:p="http://schemas.openxmlformats.org/presentationml/2006/main" type="title" preserve="1" showMasterSp="0">
+<p:sldLayout xmlns:a="http://schemas.openxmlformats.org/drawingml/2006/main" xmlns:r="http://schemas.openxmlformats.org/officeDocument/2006/relationships" xmlns:p="http://schemas.openxmlformats.org/presentationml/2006/main" showMasterSp="0" type="title" preserve="1">
   <p:cSld name="Diapositiva de título">
     <p:spTree>
       <p:nvGrpSpPr>
@@ -837,6 +842,7 @@
           <a:p>
             <a:fld id="{849D8D26-A748-46E9-A542-215C52EC9E7C}" type="datetimeFigureOut">
               <a:rPr lang="en-US" smtClean="0"/>
+              <a:t>10/4/2019</a:t>
             </a:fld>
             <a:endParaRPr lang="en-US"/>
           </a:p>
@@ -878,6 +884,7 @@
           <a:p>
             <a:fld id="{24130969-5BD5-4700-B021-68CBC9F29885}" type="slidenum">
               <a:rPr lang="en-US" smtClean="0"/>
+              <a:t>‹Nº›</a:t>
             </a:fld>
             <a:endParaRPr lang="en-US"/>
           </a:p>
@@ -888,13 +895,13 @@
   <p:clrMapOvr>
     <a:masterClrMapping/>
   </p:clrMapOvr>
-  <mc:AlternateContent xmlns:mc="http://schemas.openxmlformats.org/markup-compatibility/2006">
-    <mc:Choice xmlns:p14="http://schemas.microsoft.com/office/powerpoint/2010/main" Requires="p14">
-      <p:transition p14:dur="500">
+  <mc:AlternateContent xmlns:mc="http://schemas.openxmlformats.org/markup-compatibility/2006" xmlns:p14="http://schemas.microsoft.com/office/powerpoint/2010/main">
+    <mc:Choice Requires="p14">
+      <p:transition>
         <p:fade thruBlk="1"/>
       </p:transition>
     </mc:Choice>
-    <mc:Fallback>
+    <mc:Fallback xmlns="">
       <p:transition>
         <p:fade thruBlk="1"/>
       </p:transition>
@@ -904,7 +911,7 @@
 </file>
 
 <file path=ppt/slideLayouts/slideLayout10.xml><?xml version="1.0" encoding="utf-8"?>
-<p:sldLayout xmlns:a="http://schemas.openxmlformats.org/drawingml/2006/main" xmlns:r="http://schemas.openxmlformats.org/officeDocument/2006/relationships" xmlns:p="http://schemas.openxmlformats.org/presentationml/2006/main" preserve="1" showMasterSp="0">
+<p:sldLayout xmlns:a="http://schemas.openxmlformats.org/drawingml/2006/main" xmlns:r="http://schemas.openxmlformats.org/officeDocument/2006/relationships" xmlns:p="http://schemas.openxmlformats.org/presentationml/2006/main" showMasterSp="0" preserve="1">
   <p:cSld name="Título y descripción">
     <p:spTree>
       <p:nvGrpSpPr>
@@ -1073,7 +1080,6 @@
               <a:rPr lang="es-ES" smtClean="0"/>
               <a:t>Haga clic para modificar el estilo de texto del patrón</a:t>
             </a:r>
-            <a:endParaRPr lang="es-ES" smtClean="0"/>
           </a:p>
         </p:txBody>
       </p:sp>
@@ -1094,6 +1100,7 @@
           <a:p>
             <a:fld id="{849D8D26-A748-46E9-A542-215C52EC9E7C}" type="datetimeFigureOut">
               <a:rPr lang="en-US" smtClean="0"/>
+              <a:t>10/4/2019</a:t>
             </a:fld>
             <a:endParaRPr lang="en-US"/>
           </a:p>
@@ -1135,6 +1142,7 @@
           <a:p>
             <a:fld id="{24130969-5BD5-4700-B021-68CBC9F29885}" type="slidenum">
               <a:rPr lang="en-US" smtClean="0"/>
+              <a:t>‹Nº›</a:t>
             </a:fld>
             <a:endParaRPr lang="en-US"/>
           </a:p>
@@ -1145,13 +1153,13 @@
   <p:clrMapOvr>
     <a:masterClrMapping/>
   </p:clrMapOvr>
-  <mc:AlternateContent xmlns:mc="http://schemas.openxmlformats.org/markup-compatibility/2006">
-    <mc:Choice xmlns:p14="http://schemas.microsoft.com/office/powerpoint/2010/main" Requires="p14">
-      <p:transition p14:dur="500">
+  <mc:AlternateContent xmlns:mc="http://schemas.openxmlformats.org/markup-compatibility/2006" xmlns:p14="http://schemas.microsoft.com/office/powerpoint/2010/main">
+    <mc:Choice Requires="p14">
+      <p:transition>
         <p:fade thruBlk="1"/>
       </p:transition>
     </mc:Choice>
-    <mc:Fallback>
+    <mc:Fallback xmlns="">
       <p:transition>
         <p:fade thruBlk="1"/>
       </p:transition>
@@ -1161,7 +1169,7 @@
 </file>
 
 <file path=ppt/slideLayouts/slideLayout11.xml><?xml version="1.0" encoding="utf-8"?>
-<p:sldLayout xmlns:a="http://schemas.openxmlformats.org/drawingml/2006/main" xmlns:r="http://schemas.openxmlformats.org/officeDocument/2006/relationships" xmlns:p="http://schemas.openxmlformats.org/presentationml/2006/main" preserve="1" showMasterSp="0">
+<p:sldLayout xmlns:a="http://schemas.openxmlformats.org/drawingml/2006/main" xmlns:r="http://schemas.openxmlformats.org/officeDocument/2006/relationships" xmlns:p="http://schemas.openxmlformats.org/presentationml/2006/main" showMasterSp="0" preserve="1">
   <p:cSld name="Cita con descripción">
     <p:spTree>
       <p:nvGrpSpPr>
@@ -1271,7 +1279,6 @@
               <a:rPr lang="es-ES" smtClean="0"/>
               <a:t>Haga clic para modificar el estilo de texto del patrón</a:t>
             </a:r>
-            <a:endParaRPr lang="es-ES" smtClean="0"/>
           </a:p>
         </p:txBody>
       </p:sp>
@@ -1394,7 +1401,6 @@
               <a:rPr lang="es-ES" smtClean="0"/>
               <a:t>Haga clic para modificar el estilo de texto del patrón</a:t>
             </a:r>
-            <a:endParaRPr lang="es-ES" smtClean="0"/>
           </a:p>
         </p:txBody>
       </p:sp>
@@ -1415,6 +1421,7 @@
           <a:p>
             <a:fld id="{849D8D26-A748-46E9-A542-215C52EC9E7C}" type="datetimeFigureOut">
               <a:rPr lang="en-US" smtClean="0"/>
+              <a:t>10/4/2019</a:t>
             </a:fld>
             <a:endParaRPr lang="en-US"/>
           </a:p>
@@ -1456,6 +1463,7 @@
           <a:p>
             <a:fld id="{24130969-5BD5-4700-B021-68CBC9F29885}" type="slidenum">
               <a:rPr lang="en-US" smtClean="0"/>
+              <a:t>‹Nº›</a:t>
             </a:fld>
             <a:endParaRPr lang="en-US"/>
           </a:p>
@@ -1496,16 +1504,6 @@
               </a:rPr>
               <a:t>“</a:t>
             </a:r>
-            <a:endParaRPr lang="en-US" sz="8000" baseline="0" dirty="0">
-              <a:ln w="3175" cmpd="sng">
-                <a:noFill/>
-              </a:ln>
-              <a:solidFill>
-                <a:schemeClr val="accent1"/>
-              </a:solidFill>
-              <a:effectLst/>
-              <a:latin typeface="Arial" panose="020B0604020202020204"/>
-            </a:endParaRPr>
           </a:p>
         </p:txBody>
       </p:sp>
@@ -1544,16 +1542,6 @@
               </a:rPr>
               <a:t>”</a:t>
             </a:r>
-            <a:endParaRPr lang="en-US" sz="8000" baseline="0" dirty="0">
-              <a:ln w="3175" cmpd="sng">
-                <a:noFill/>
-              </a:ln>
-              <a:solidFill>
-                <a:schemeClr val="accent1"/>
-              </a:solidFill>
-              <a:effectLst/>
-              <a:latin typeface="Arial" panose="020B0604020202020204"/>
-            </a:endParaRPr>
           </a:p>
         </p:txBody>
       </p:sp>
@@ -1562,13 +1550,13 @@
   <p:clrMapOvr>
     <a:masterClrMapping/>
   </p:clrMapOvr>
-  <mc:AlternateContent xmlns:mc="http://schemas.openxmlformats.org/markup-compatibility/2006">
-    <mc:Choice xmlns:p14="http://schemas.microsoft.com/office/powerpoint/2010/main" Requires="p14">
-      <p:transition p14:dur="500">
+  <mc:AlternateContent xmlns:mc="http://schemas.openxmlformats.org/markup-compatibility/2006" xmlns:p14="http://schemas.microsoft.com/office/powerpoint/2010/main">
+    <mc:Choice Requires="p14">
+      <p:transition>
         <p:fade thruBlk="1"/>
       </p:transition>
     </mc:Choice>
-    <mc:Fallback>
+    <mc:Fallback xmlns="">
       <p:transition>
         <p:fade thruBlk="1"/>
       </p:transition>
@@ -1578,7 +1566,7 @@
 </file>
 
 <file path=ppt/slideLayouts/slideLayout12.xml><?xml version="1.0" encoding="utf-8"?>
-<p:sldLayout xmlns:a="http://schemas.openxmlformats.org/drawingml/2006/main" xmlns:r="http://schemas.openxmlformats.org/officeDocument/2006/relationships" xmlns:p="http://schemas.openxmlformats.org/presentationml/2006/main" preserve="1" showMasterSp="0">
+<p:sldLayout xmlns:a="http://schemas.openxmlformats.org/drawingml/2006/main" xmlns:r="http://schemas.openxmlformats.org/officeDocument/2006/relationships" xmlns:p="http://schemas.openxmlformats.org/presentationml/2006/main" showMasterSp="0" preserve="1">
   <p:cSld name="Tarjeta de nombre">
     <p:spTree>
       <p:nvGrpSpPr>
@@ -1747,7 +1735,6 @@
               <a:rPr lang="es-ES" smtClean="0"/>
               <a:t>Haga clic para modificar el estilo de texto del patrón</a:t>
             </a:r>
-            <a:endParaRPr lang="es-ES" smtClean="0"/>
           </a:p>
         </p:txBody>
       </p:sp>
@@ -1768,6 +1755,7 @@
           <a:p>
             <a:fld id="{849D8D26-A748-46E9-A542-215C52EC9E7C}" type="datetimeFigureOut">
               <a:rPr lang="en-US" smtClean="0"/>
+              <a:t>10/4/2019</a:t>
             </a:fld>
             <a:endParaRPr lang="en-US"/>
           </a:p>
@@ -1809,6 +1797,7 @@
           <a:p>
             <a:fld id="{24130969-5BD5-4700-B021-68CBC9F29885}" type="slidenum">
               <a:rPr lang="en-US" smtClean="0"/>
+              <a:t>‹Nº›</a:t>
             </a:fld>
             <a:endParaRPr lang="en-US"/>
           </a:p>
@@ -1819,13 +1808,13 @@
   <p:clrMapOvr>
     <a:masterClrMapping/>
   </p:clrMapOvr>
-  <mc:AlternateContent xmlns:mc="http://schemas.openxmlformats.org/markup-compatibility/2006">
-    <mc:Choice xmlns:p14="http://schemas.microsoft.com/office/powerpoint/2010/main" Requires="p14">
-      <p:transition p14:dur="500">
+  <mc:AlternateContent xmlns:mc="http://schemas.openxmlformats.org/markup-compatibility/2006" xmlns:p14="http://schemas.microsoft.com/office/powerpoint/2010/main">
+    <mc:Choice Requires="p14">
+      <p:transition>
         <p:fade thruBlk="1"/>
       </p:transition>
     </mc:Choice>
-    <mc:Fallback>
+    <mc:Fallback xmlns="">
       <p:transition>
         <p:fade thruBlk="1"/>
       </p:transition>
@@ -1835,7 +1824,7 @@
 </file>
 
 <file path=ppt/slideLayouts/slideLayout13.xml><?xml version="1.0" encoding="utf-8"?>
-<p:sldLayout xmlns:a="http://schemas.openxmlformats.org/drawingml/2006/main" xmlns:r="http://schemas.openxmlformats.org/officeDocument/2006/relationships" xmlns:p="http://schemas.openxmlformats.org/presentationml/2006/main" preserve="1" showMasterSp="0">
+<p:sldLayout xmlns:a="http://schemas.openxmlformats.org/drawingml/2006/main" xmlns:r="http://schemas.openxmlformats.org/officeDocument/2006/relationships" xmlns:p="http://schemas.openxmlformats.org/presentationml/2006/main" showMasterSp="0" preserve="1">
   <p:cSld name="Citar la tarjeta de nombre">
     <p:spTree>
       <p:nvGrpSpPr>
@@ -1945,7 +1934,6 @@
               <a:rPr lang="es-ES" smtClean="0"/>
               <a:t>Haga clic para modificar el estilo de texto del patrón</a:t>
             </a:r>
-            <a:endParaRPr lang="es-ES" smtClean="0"/>
           </a:p>
         </p:txBody>
       </p:sp>
@@ -2068,7 +2056,6 @@
               <a:rPr lang="es-ES" smtClean="0"/>
               <a:t>Haga clic para modificar el estilo de texto del patrón</a:t>
             </a:r>
-            <a:endParaRPr lang="es-ES" smtClean="0"/>
           </a:p>
         </p:txBody>
       </p:sp>
@@ -2089,6 +2076,7 @@
           <a:p>
             <a:fld id="{849D8D26-A748-46E9-A542-215C52EC9E7C}" type="datetimeFigureOut">
               <a:rPr lang="en-US" smtClean="0"/>
+              <a:t>10/4/2019</a:t>
             </a:fld>
             <a:endParaRPr lang="en-US"/>
           </a:p>
@@ -2130,6 +2118,7 @@
           <a:p>
             <a:fld id="{24130969-5BD5-4700-B021-68CBC9F29885}" type="slidenum">
               <a:rPr lang="en-US" smtClean="0"/>
+              <a:t>‹Nº›</a:t>
             </a:fld>
             <a:endParaRPr lang="en-US"/>
           </a:p>
@@ -2170,16 +2159,6 @@
               </a:rPr>
               <a:t>“</a:t>
             </a:r>
-            <a:endParaRPr lang="en-US" sz="8000" baseline="0" dirty="0">
-              <a:ln w="3175" cmpd="sng">
-                <a:noFill/>
-              </a:ln>
-              <a:solidFill>
-                <a:schemeClr val="accent1"/>
-              </a:solidFill>
-              <a:effectLst/>
-              <a:latin typeface="Arial" panose="020B0604020202020204"/>
-            </a:endParaRPr>
           </a:p>
         </p:txBody>
       </p:sp>
@@ -2218,16 +2197,6 @@
               </a:rPr>
               <a:t>”</a:t>
             </a:r>
-            <a:endParaRPr lang="en-US" sz="8000" baseline="0" dirty="0">
-              <a:ln w="3175" cmpd="sng">
-                <a:noFill/>
-              </a:ln>
-              <a:solidFill>
-                <a:schemeClr val="accent1"/>
-              </a:solidFill>
-              <a:effectLst/>
-              <a:latin typeface="Arial" panose="020B0604020202020204"/>
-            </a:endParaRPr>
           </a:p>
         </p:txBody>
       </p:sp>
@@ -2236,13 +2205,13 @@
   <p:clrMapOvr>
     <a:masterClrMapping/>
   </p:clrMapOvr>
-  <mc:AlternateContent xmlns:mc="http://schemas.openxmlformats.org/markup-compatibility/2006">
-    <mc:Choice xmlns:p14="http://schemas.microsoft.com/office/powerpoint/2010/main" Requires="p14">
-      <p:transition p14:dur="500">
+  <mc:AlternateContent xmlns:mc="http://schemas.openxmlformats.org/markup-compatibility/2006" xmlns:p14="http://schemas.microsoft.com/office/powerpoint/2010/main">
+    <mc:Choice Requires="p14">
+      <p:transition>
         <p:fade thruBlk="1"/>
       </p:transition>
     </mc:Choice>
-    <mc:Fallback>
+    <mc:Fallback xmlns="">
       <p:transition>
         <p:fade thruBlk="1"/>
       </p:transition>
@@ -2252,7 +2221,7 @@
 </file>
 
 <file path=ppt/slideLayouts/slideLayout14.xml><?xml version="1.0" encoding="utf-8"?>
-<p:sldLayout xmlns:a="http://schemas.openxmlformats.org/drawingml/2006/main" xmlns:r="http://schemas.openxmlformats.org/officeDocument/2006/relationships" xmlns:p="http://schemas.openxmlformats.org/presentationml/2006/main" preserve="1" showMasterSp="0">
+<p:sldLayout xmlns:a="http://schemas.openxmlformats.org/drawingml/2006/main" xmlns:r="http://schemas.openxmlformats.org/officeDocument/2006/relationships" xmlns:p="http://schemas.openxmlformats.org/presentationml/2006/main" showMasterSp="0" preserve="1">
   <p:cSld name="Verdadero o falso">
     <p:spTree>
       <p:nvGrpSpPr>
@@ -2359,7 +2328,6 @@
               <a:rPr lang="es-ES" smtClean="0"/>
               <a:t>Haga clic para modificar el estilo de texto del patrón</a:t>
             </a:r>
-            <a:endParaRPr lang="es-ES" smtClean="0"/>
           </a:p>
         </p:txBody>
       </p:sp>
@@ -2482,7 +2450,6 @@
               <a:rPr lang="es-ES" smtClean="0"/>
               <a:t>Haga clic para modificar el estilo de texto del patrón</a:t>
             </a:r>
-            <a:endParaRPr lang="es-ES" smtClean="0"/>
           </a:p>
         </p:txBody>
       </p:sp>
@@ -2503,6 +2470,7 @@
           <a:p>
             <a:fld id="{849D8D26-A748-46E9-A542-215C52EC9E7C}" type="datetimeFigureOut">
               <a:rPr lang="en-US" smtClean="0"/>
+              <a:t>10/4/2019</a:t>
             </a:fld>
             <a:endParaRPr lang="en-US"/>
           </a:p>
@@ -2544,6 +2512,7 @@
           <a:p>
             <a:fld id="{24130969-5BD5-4700-B021-68CBC9F29885}" type="slidenum">
               <a:rPr lang="en-US" smtClean="0"/>
+              <a:t>‹Nº›</a:t>
             </a:fld>
             <a:endParaRPr lang="en-US"/>
           </a:p>
@@ -2554,13 +2523,13 @@
   <p:clrMapOvr>
     <a:masterClrMapping/>
   </p:clrMapOvr>
-  <mc:AlternateContent xmlns:mc="http://schemas.openxmlformats.org/markup-compatibility/2006">
-    <mc:Choice xmlns:p14="http://schemas.microsoft.com/office/powerpoint/2010/main" Requires="p14">
-      <p:transition p14:dur="500">
+  <mc:AlternateContent xmlns:mc="http://schemas.openxmlformats.org/markup-compatibility/2006" xmlns:p14="http://schemas.microsoft.com/office/powerpoint/2010/main">
+    <mc:Choice Requires="p14">
+      <p:transition>
         <p:fade thruBlk="1"/>
       </p:transition>
     </mc:Choice>
-    <mc:Fallback>
+    <mc:Fallback xmlns="">
       <p:transition>
         <p:fade thruBlk="1"/>
       </p:transition>
@@ -2570,7 +2539,7 @@
 </file>
 
 <file path=ppt/slideLayouts/slideLayout15.xml><?xml version="1.0" encoding="utf-8"?>
-<p:sldLayout xmlns:a="http://schemas.openxmlformats.org/drawingml/2006/main" xmlns:r="http://schemas.openxmlformats.org/officeDocument/2006/relationships" xmlns:p="http://schemas.openxmlformats.org/presentationml/2006/main" type="vertTx" preserve="1" showMasterSp="0">
+<p:sldLayout xmlns:a="http://schemas.openxmlformats.org/drawingml/2006/main" xmlns:r="http://schemas.openxmlformats.org/officeDocument/2006/relationships" xmlns:p="http://schemas.openxmlformats.org/presentationml/2006/main" showMasterSp="0" type="vertTx" preserve="1">
   <p:cSld name="Título y texto vertical">
     <p:spTree>
       <p:nvGrpSpPr>
@@ -2629,7 +2598,6 @@
               <a:rPr lang="es-ES" smtClean="0"/>
               <a:t>Haga clic para modificar el estilo de texto del patrón</a:t>
             </a:r>
-            <a:endParaRPr lang="es-ES" smtClean="0"/>
           </a:p>
           <a:p>
             <a:pPr lvl="1"/>
@@ -2637,7 +2605,6 @@
               <a:rPr lang="es-ES" smtClean="0"/>
               <a:t>Segundo nivel</a:t>
             </a:r>
-            <a:endParaRPr lang="es-ES" smtClean="0"/>
           </a:p>
           <a:p>
             <a:pPr lvl="2"/>
@@ -2645,7 +2612,6 @@
               <a:rPr lang="es-ES" smtClean="0"/>
               <a:t>Tercer nivel</a:t>
             </a:r>
-            <a:endParaRPr lang="es-ES" smtClean="0"/>
           </a:p>
           <a:p>
             <a:pPr lvl="3"/>
@@ -2653,7 +2619,6 @@
               <a:rPr lang="es-ES" smtClean="0"/>
               <a:t>Cuarto nivel</a:t>
             </a:r>
-            <a:endParaRPr lang="es-ES" smtClean="0"/>
           </a:p>
           <a:p>
             <a:pPr lvl="4"/>
@@ -2682,6 +2647,7 @@
           <a:p>
             <a:fld id="{849D8D26-A748-46E9-A542-215C52EC9E7C}" type="datetimeFigureOut">
               <a:rPr lang="en-US" smtClean="0"/>
+              <a:t>10/4/2019</a:t>
             </a:fld>
             <a:endParaRPr lang="en-US"/>
           </a:p>
@@ -2723,6 +2689,7 @@
           <a:p>
             <a:fld id="{24130969-5BD5-4700-B021-68CBC9F29885}" type="slidenum">
               <a:rPr lang="en-US" smtClean="0"/>
+              <a:t>‹Nº›</a:t>
             </a:fld>
             <a:endParaRPr lang="en-US"/>
           </a:p>
@@ -2733,13 +2700,13 @@
   <p:clrMapOvr>
     <a:masterClrMapping/>
   </p:clrMapOvr>
-  <mc:AlternateContent xmlns:mc="http://schemas.openxmlformats.org/markup-compatibility/2006">
-    <mc:Choice xmlns:p14="http://schemas.microsoft.com/office/powerpoint/2010/main" Requires="p14">
-      <p:transition p14:dur="500">
+  <mc:AlternateContent xmlns:mc="http://schemas.openxmlformats.org/markup-compatibility/2006" xmlns:p14="http://schemas.microsoft.com/office/powerpoint/2010/main">
+    <mc:Choice Requires="p14">
+      <p:transition>
         <p:fade thruBlk="1"/>
       </p:transition>
     </mc:Choice>
-    <mc:Fallback>
+    <mc:Fallback xmlns="">
       <p:transition>
         <p:fade thruBlk="1"/>
       </p:transition>
@@ -2749,7 +2716,7 @@
 </file>
 
 <file path=ppt/slideLayouts/slideLayout16.xml><?xml version="1.0" encoding="utf-8"?>
-<p:sldLayout xmlns:a="http://schemas.openxmlformats.org/drawingml/2006/main" xmlns:r="http://schemas.openxmlformats.org/officeDocument/2006/relationships" xmlns:p="http://schemas.openxmlformats.org/presentationml/2006/main" type="vertTitleAndTx" preserve="1" showMasterSp="0">
+<p:sldLayout xmlns:a="http://schemas.openxmlformats.org/drawingml/2006/main" xmlns:r="http://schemas.openxmlformats.org/officeDocument/2006/relationships" xmlns:p="http://schemas.openxmlformats.org/presentationml/2006/main" showMasterSp="0" type="vertTitleAndTx" preserve="1">
   <p:cSld name="Título vertical y texto">
     <p:spTree>
       <p:nvGrpSpPr>
@@ -2818,7 +2785,6 @@
               <a:rPr lang="es-ES" smtClean="0"/>
               <a:t>Haga clic para modificar el estilo de texto del patrón</a:t>
             </a:r>
-            <a:endParaRPr lang="es-ES" smtClean="0"/>
           </a:p>
           <a:p>
             <a:pPr lvl="1"/>
@@ -2826,7 +2792,6 @@
               <a:rPr lang="es-ES" smtClean="0"/>
               <a:t>Segundo nivel</a:t>
             </a:r>
-            <a:endParaRPr lang="es-ES" smtClean="0"/>
           </a:p>
           <a:p>
             <a:pPr lvl="2"/>
@@ -2834,7 +2799,6 @@
               <a:rPr lang="es-ES" smtClean="0"/>
               <a:t>Tercer nivel</a:t>
             </a:r>
-            <a:endParaRPr lang="es-ES" smtClean="0"/>
           </a:p>
           <a:p>
             <a:pPr lvl="3"/>
@@ -2842,7 +2806,6 @@
               <a:rPr lang="es-ES" smtClean="0"/>
               <a:t>Cuarto nivel</a:t>
             </a:r>
-            <a:endParaRPr lang="es-ES" smtClean="0"/>
           </a:p>
           <a:p>
             <a:pPr lvl="4"/>
@@ -2871,6 +2834,7 @@
           <a:p>
             <a:fld id="{849D8D26-A748-46E9-A542-215C52EC9E7C}" type="datetimeFigureOut">
               <a:rPr lang="en-US" smtClean="0"/>
+              <a:t>10/4/2019</a:t>
             </a:fld>
             <a:endParaRPr lang="en-US"/>
           </a:p>
@@ -2912,6 +2876,7 @@
           <a:p>
             <a:fld id="{24130969-5BD5-4700-B021-68CBC9F29885}" type="slidenum">
               <a:rPr lang="en-US" smtClean="0"/>
+              <a:t>‹Nº›</a:t>
             </a:fld>
             <a:endParaRPr lang="en-US"/>
           </a:p>
@@ -2922,13 +2887,13 @@
   <p:clrMapOvr>
     <a:masterClrMapping/>
   </p:clrMapOvr>
-  <mc:AlternateContent xmlns:mc="http://schemas.openxmlformats.org/markup-compatibility/2006">
-    <mc:Choice xmlns:p14="http://schemas.microsoft.com/office/powerpoint/2010/main" Requires="p14">
-      <p:transition p14:dur="500">
+  <mc:AlternateContent xmlns:mc="http://schemas.openxmlformats.org/markup-compatibility/2006" xmlns:p14="http://schemas.microsoft.com/office/powerpoint/2010/main">
+    <mc:Choice Requires="p14">
+      <p:transition>
         <p:fade thruBlk="1"/>
       </p:transition>
     </mc:Choice>
-    <mc:Fallback>
+    <mc:Fallback xmlns="">
       <p:transition>
         <p:fade thruBlk="1"/>
       </p:transition>
@@ -2938,7 +2903,7 @@
 </file>
 
 <file path=ppt/slideLayouts/slideLayout2.xml><?xml version="1.0" encoding="utf-8"?>
-<p:sldLayout xmlns:a="http://schemas.openxmlformats.org/drawingml/2006/main" xmlns:r="http://schemas.openxmlformats.org/officeDocument/2006/relationships" xmlns:p="http://schemas.openxmlformats.org/presentationml/2006/main" type="obj" preserve="1" showMasterSp="0">
+<p:sldLayout xmlns:a="http://schemas.openxmlformats.org/drawingml/2006/main" xmlns:r="http://schemas.openxmlformats.org/officeDocument/2006/relationships" xmlns:p="http://schemas.openxmlformats.org/presentationml/2006/main" showMasterSp="0" type="obj" preserve="1">
   <p:cSld name="Título y objetos">
     <p:spTree>
       <p:nvGrpSpPr>
@@ -3003,7 +2968,6 @@
               <a:rPr lang="es-ES" smtClean="0"/>
               <a:t>Haga clic para modificar el estilo de texto del patrón</a:t>
             </a:r>
-            <a:endParaRPr lang="es-ES" smtClean="0"/>
           </a:p>
           <a:p>
             <a:pPr lvl="1"/>
@@ -3011,7 +2975,6 @@
               <a:rPr lang="es-ES" smtClean="0"/>
               <a:t>Segundo nivel</a:t>
             </a:r>
-            <a:endParaRPr lang="es-ES" smtClean="0"/>
           </a:p>
           <a:p>
             <a:pPr lvl="2"/>
@@ -3019,7 +2982,6 @@
               <a:rPr lang="es-ES" smtClean="0"/>
               <a:t>Tercer nivel</a:t>
             </a:r>
-            <a:endParaRPr lang="es-ES" smtClean="0"/>
           </a:p>
           <a:p>
             <a:pPr lvl="3"/>
@@ -3027,7 +2989,6 @@
               <a:rPr lang="es-ES" smtClean="0"/>
               <a:t>Cuarto nivel</a:t>
             </a:r>
-            <a:endParaRPr lang="es-ES" smtClean="0"/>
           </a:p>
           <a:p>
             <a:pPr lvl="4"/>
@@ -3056,6 +3017,7 @@
           <a:p>
             <a:fld id="{849D8D26-A748-46E9-A542-215C52EC9E7C}" type="datetimeFigureOut">
               <a:rPr lang="en-US" smtClean="0"/>
+              <a:t>10/4/2019</a:t>
             </a:fld>
             <a:endParaRPr lang="en-US"/>
           </a:p>
@@ -3097,6 +3059,7 @@
           <a:p>
             <a:fld id="{24130969-5BD5-4700-B021-68CBC9F29885}" type="slidenum">
               <a:rPr lang="en-US" smtClean="0"/>
+              <a:t>‹Nº›</a:t>
             </a:fld>
             <a:endParaRPr lang="en-US"/>
           </a:p>
@@ -3107,13 +3070,13 @@
   <p:clrMapOvr>
     <a:masterClrMapping/>
   </p:clrMapOvr>
-  <mc:AlternateContent xmlns:mc="http://schemas.openxmlformats.org/markup-compatibility/2006">
-    <mc:Choice xmlns:p14="http://schemas.microsoft.com/office/powerpoint/2010/main" Requires="p14">
-      <p:transition p14:dur="500">
+  <mc:AlternateContent xmlns:mc="http://schemas.openxmlformats.org/markup-compatibility/2006" xmlns:p14="http://schemas.microsoft.com/office/powerpoint/2010/main">
+    <mc:Choice Requires="p14">
+      <p:transition>
         <p:fade thruBlk="1"/>
       </p:transition>
     </mc:Choice>
-    <mc:Fallback>
+    <mc:Fallback xmlns="">
       <p:transition>
         <p:fade thruBlk="1"/>
       </p:transition>
@@ -3123,7 +3086,7 @@
 </file>
 
 <file path=ppt/slideLayouts/slideLayout3.xml><?xml version="1.0" encoding="utf-8"?>
-<p:sldLayout xmlns:a="http://schemas.openxmlformats.org/drawingml/2006/main" xmlns:r="http://schemas.openxmlformats.org/officeDocument/2006/relationships" xmlns:p="http://schemas.openxmlformats.org/presentationml/2006/main" type="secHead" preserve="1" showMasterSp="0">
+<p:sldLayout xmlns:a="http://schemas.openxmlformats.org/drawingml/2006/main" xmlns:r="http://schemas.openxmlformats.org/officeDocument/2006/relationships" xmlns:p="http://schemas.openxmlformats.org/presentationml/2006/main" showMasterSp="0" type="secHead" preserve="1">
   <p:cSld name="Encabezado de sección">
     <p:spTree>
       <p:nvGrpSpPr>
@@ -3288,7 +3251,6 @@
               <a:rPr lang="es-ES" smtClean="0"/>
               <a:t>Haga clic para modificar el estilo de texto del patrón</a:t>
             </a:r>
-            <a:endParaRPr lang="es-ES" smtClean="0"/>
           </a:p>
         </p:txBody>
       </p:sp>
@@ -3309,6 +3271,7 @@
           <a:p>
             <a:fld id="{849D8D26-A748-46E9-A542-215C52EC9E7C}" type="datetimeFigureOut">
               <a:rPr lang="en-US" smtClean="0"/>
+              <a:t>10/4/2019</a:t>
             </a:fld>
             <a:endParaRPr lang="en-US"/>
           </a:p>
@@ -3350,6 +3313,7 @@
           <a:p>
             <a:fld id="{24130969-5BD5-4700-B021-68CBC9F29885}" type="slidenum">
               <a:rPr lang="en-US" smtClean="0"/>
+              <a:t>‹Nº›</a:t>
             </a:fld>
             <a:endParaRPr lang="en-US"/>
           </a:p>
@@ -3360,13 +3324,13 @@
   <p:clrMapOvr>
     <a:masterClrMapping/>
   </p:clrMapOvr>
-  <mc:AlternateContent xmlns:mc="http://schemas.openxmlformats.org/markup-compatibility/2006">
-    <mc:Choice xmlns:p14="http://schemas.microsoft.com/office/powerpoint/2010/main" Requires="p14">
-      <p:transition p14:dur="500">
+  <mc:AlternateContent xmlns:mc="http://schemas.openxmlformats.org/markup-compatibility/2006" xmlns:p14="http://schemas.microsoft.com/office/powerpoint/2010/main">
+    <mc:Choice Requires="p14">
+      <p:transition>
         <p:fade thruBlk="1"/>
       </p:transition>
     </mc:Choice>
-    <mc:Fallback>
+    <mc:Fallback xmlns="">
       <p:transition>
         <p:fade thruBlk="1"/>
       </p:transition>
@@ -3376,7 +3340,7 @@
 </file>
 
 <file path=ppt/slideLayouts/slideLayout4.xml><?xml version="1.0" encoding="utf-8"?>
-<p:sldLayout xmlns:a="http://schemas.openxmlformats.org/drawingml/2006/main" xmlns:r="http://schemas.openxmlformats.org/officeDocument/2006/relationships" xmlns:p="http://schemas.openxmlformats.org/presentationml/2006/main" type="twoObj" preserve="1" showMasterSp="0">
+<p:sldLayout xmlns:a="http://schemas.openxmlformats.org/drawingml/2006/main" xmlns:r="http://schemas.openxmlformats.org/officeDocument/2006/relationships" xmlns:p="http://schemas.openxmlformats.org/presentationml/2006/main" showMasterSp="0" type="twoObj" preserve="1">
   <p:cSld name="Dos objetos">
     <p:spTree>
       <p:nvGrpSpPr>
@@ -3440,7 +3404,6 @@
               <a:rPr lang="es-ES" smtClean="0"/>
               <a:t>Haga clic para modificar el estilo de texto del patrón</a:t>
             </a:r>
-            <a:endParaRPr lang="es-ES" smtClean="0"/>
           </a:p>
           <a:p>
             <a:pPr lvl="1"/>
@@ -3448,7 +3411,6 @@
               <a:rPr lang="es-ES" smtClean="0"/>
               <a:t>Segundo nivel</a:t>
             </a:r>
-            <a:endParaRPr lang="es-ES" smtClean="0"/>
           </a:p>
           <a:p>
             <a:pPr lvl="2"/>
@@ -3456,7 +3418,6 @@
               <a:rPr lang="es-ES" smtClean="0"/>
               <a:t>Tercer nivel</a:t>
             </a:r>
-            <a:endParaRPr lang="es-ES" smtClean="0"/>
           </a:p>
           <a:p>
             <a:pPr lvl="3"/>
@@ -3464,7 +3425,6 @@
               <a:rPr lang="es-ES" smtClean="0"/>
               <a:t>Cuarto nivel</a:t>
             </a:r>
-            <a:endParaRPr lang="es-ES" smtClean="0"/>
           </a:p>
           <a:p>
             <a:pPr lvl="4"/>
@@ -3501,7 +3461,6 @@
               <a:rPr lang="es-ES" smtClean="0"/>
               <a:t>Haga clic para modificar el estilo de texto del patrón</a:t>
             </a:r>
-            <a:endParaRPr lang="es-ES" smtClean="0"/>
           </a:p>
           <a:p>
             <a:pPr lvl="1"/>
@@ -3509,7 +3468,6 @@
               <a:rPr lang="es-ES" smtClean="0"/>
               <a:t>Segundo nivel</a:t>
             </a:r>
-            <a:endParaRPr lang="es-ES" smtClean="0"/>
           </a:p>
           <a:p>
             <a:pPr lvl="2"/>
@@ -3517,7 +3475,6 @@
               <a:rPr lang="es-ES" smtClean="0"/>
               <a:t>Tercer nivel</a:t>
             </a:r>
-            <a:endParaRPr lang="es-ES" smtClean="0"/>
           </a:p>
           <a:p>
             <a:pPr lvl="3"/>
@@ -3525,7 +3482,6 @@
               <a:rPr lang="es-ES" smtClean="0"/>
               <a:t>Cuarto nivel</a:t>
             </a:r>
-            <a:endParaRPr lang="es-ES" smtClean="0"/>
           </a:p>
           <a:p>
             <a:pPr lvl="4"/>
@@ -3554,6 +3510,7 @@
           <a:p>
             <a:fld id="{849D8D26-A748-46E9-A542-215C52EC9E7C}" type="datetimeFigureOut">
               <a:rPr lang="en-US" smtClean="0"/>
+              <a:t>10/4/2019</a:t>
             </a:fld>
             <a:endParaRPr lang="en-US"/>
           </a:p>
@@ -3595,6 +3552,7 @@
           <a:p>
             <a:fld id="{24130969-5BD5-4700-B021-68CBC9F29885}" type="slidenum">
               <a:rPr lang="en-US" smtClean="0"/>
+              <a:t>‹Nº›</a:t>
             </a:fld>
             <a:endParaRPr lang="en-US"/>
           </a:p>
@@ -3605,13 +3563,13 @@
   <p:clrMapOvr>
     <a:masterClrMapping/>
   </p:clrMapOvr>
-  <mc:AlternateContent xmlns:mc="http://schemas.openxmlformats.org/markup-compatibility/2006">
-    <mc:Choice xmlns:p14="http://schemas.microsoft.com/office/powerpoint/2010/main" Requires="p14">
-      <p:transition p14:dur="500">
+  <mc:AlternateContent xmlns:mc="http://schemas.openxmlformats.org/markup-compatibility/2006" xmlns:p14="http://schemas.microsoft.com/office/powerpoint/2010/main">
+    <mc:Choice Requires="p14">
+      <p:transition>
         <p:fade thruBlk="1"/>
       </p:transition>
     </mc:Choice>
-    <mc:Fallback>
+    <mc:Fallback xmlns="">
       <p:transition>
         <p:fade thruBlk="1"/>
       </p:transition>
@@ -3621,7 +3579,7 @@
 </file>
 
 <file path=ppt/slideLayouts/slideLayout5.xml><?xml version="1.0" encoding="utf-8"?>
-<p:sldLayout xmlns:a="http://schemas.openxmlformats.org/drawingml/2006/main" xmlns:r="http://schemas.openxmlformats.org/officeDocument/2006/relationships" xmlns:p="http://schemas.openxmlformats.org/presentationml/2006/main" type="twoTxTwoObj" preserve="1" showMasterSp="0">
+<p:sldLayout xmlns:a="http://schemas.openxmlformats.org/drawingml/2006/main" xmlns:r="http://schemas.openxmlformats.org/officeDocument/2006/relationships" xmlns:p="http://schemas.openxmlformats.org/presentationml/2006/main" showMasterSp="0" type="twoTxTwoObj" preserve="1">
   <p:cSld name="Comparación">
     <p:spTree>
       <p:nvGrpSpPr>
@@ -3728,7 +3686,6 @@
               <a:rPr lang="es-ES" smtClean="0"/>
               <a:t>Haga clic para modificar el estilo de texto del patrón</a:t>
             </a:r>
-            <a:endParaRPr lang="es-ES" smtClean="0"/>
           </a:p>
         </p:txBody>
       </p:sp>
@@ -3759,7 +3716,6 @@
               <a:rPr lang="es-ES" smtClean="0"/>
               <a:t>Haga clic para modificar el estilo de texto del patrón</a:t>
             </a:r>
-            <a:endParaRPr lang="es-ES" smtClean="0"/>
           </a:p>
           <a:p>
             <a:pPr lvl="1"/>
@@ -3767,7 +3723,6 @@
               <a:rPr lang="es-ES" smtClean="0"/>
               <a:t>Segundo nivel</a:t>
             </a:r>
-            <a:endParaRPr lang="es-ES" smtClean="0"/>
           </a:p>
           <a:p>
             <a:pPr lvl="2"/>
@@ -3775,7 +3730,6 @@
               <a:rPr lang="es-ES" smtClean="0"/>
               <a:t>Tercer nivel</a:t>
             </a:r>
-            <a:endParaRPr lang="es-ES" smtClean="0"/>
           </a:p>
           <a:p>
             <a:pPr lvl="3"/>
@@ -3783,7 +3737,6 @@
               <a:rPr lang="es-ES" smtClean="0"/>
               <a:t>Cuarto nivel</a:t>
             </a:r>
-            <a:endParaRPr lang="es-ES" smtClean="0"/>
           </a:p>
           <a:p>
             <a:pPr lvl="4"/>
@@ -3859,7 +3812,6 @@
               <a:rPr lang="es-ES" smtClean="0"/>
               <a:t>Haga clic para modificar el estilo de texto del patrón</a:t>
             </a:r>
-            <a:endParaRPr lang="es-ES" smtClean="0"/>
           </a:p>
         </p:txBody>
       </p:sp>
@@ -3890,7 +3842,6 @@
               <a:rPr lang="es-ES" smtClean="0"/>
               <a:t>Haga clic para modificar el estilo de texto del patrón</a:t>
             </a:r>
-            <a:endParaRPr lang="es-ES" smtClean="0"/>
           </a:p>
           <a:p>
             <a:pPr lvl="1"/>
@@ -3898,7 +3849,6 @@
               <a:rPr lang="es-ES" smtClean="0"/>
               <a:t>Segundo nivel</a:t>
             </a:r>
-            <a:endParaRPr lang="es-ES" smtClean="0"/>
           </a:p>
           <a:p>
             <a:pPr lvl="2"/>
@@ -3906,7 +3856,6 @@
               <a:rPr lang="es-ES" smtClean="0"/>
               <a:t>Tercer nivel</a:t>
             </a:r>
-            <a:endParaRPr lang="es-ES" smtClean="0"/>
           </a:p>
           <a:p>
             <a:pPr lvl="3"/>
@@ -3914,7 +3863,6 @@
               <a:rPr lang="es-ES" smtClean="0"/>
               <a:t>Cuarto nivel</a:t>
             </a:r>
-            <a:endParaRPr lang="es-ES" smtClean="0"/>
           </a:p>
           <a:p>
             <a:pPr lvl="4"/>
@@ -3943,6 +3891,7 @@
           <a:p>
             <a:fld id="{849D8D26-A748-46E9-A542-215C52EC9E7C}" type="datetimeFigureOut">
               <a:rPr lang="en-US" smtClean="0"/>
+              <a:t>10/4/2019</a:t>
             </a:fld>
             <a:endParaRPr lang="en-US"/>
           </a:p>
@@ -3984,6 +3933,7 @@
           <a:p>
             <a:fld id="{24130969-5BD5-4700-B021-68CBC9F29885}" type="slidenum">
               <a:rPr lang="en-US" smtClean="0"/>
+              <a:t>‹Nº›</a:t>
             </a:fld>
             <a:endParaRPr lang="en-US"/>
           </a:p>
@@ -3994,13 +3944,13 @@
   <p:clrMapOvr>
     <a:masterClrMapping/>
   </p:clrMapOvr>
-  <mc:AlternateContent xmlns:mc="http://schemas.openxmlformats.org/markup-compatibility/2006">
-    <mc:Choice xmlns:p14="http://schemas.microsoft.com/office/powerpoint/2010/main" Requires="p14">
-      <p:transition p14:dur="500">
+  <mc:AlternateContent xmlns:mc="http://schemas.openxmlformats.org/markup-compatibility/2006" xmlns:p14="http://schemas.microsoft.com/office/powerpoint/2010/main">
+    <mc:Choice Requires="p14">
+      <p:transition>
         <p:fade thruBlk="1"/>
       </p:transition>
     </mc:Choice>
-    <mc:Fallback>
+    <mc:Fallback xmlns="">
       <p:transition>
         <p:fade thruBlk="1"/>
       </p:transition>
@@ -4010,7 +3960,7 @@
 </file>
 
 <file path=ppt/slideLayouts/slideLayout6.xml><?xml version="1.0" encoding="utf-8"?>
-<p:sldLayout xmlns:a="http://schemas.openxmlformats.org/drawingml/2006/main" xmlns:r="http://schemas.openxmlformats.org/officeDocument/2006/relationships" xmlns:p="http://schemas.openxmlformats.org/presentationml/2006/main" type="titleOnly" preserve="1" showMasterSp="0">
+<p:sldLayout xmlns:a="http://schemas.openxmlformats.org/drawingml/2006/main" xmlns:r="http://schemas.openxmlformats.org/officeDocument/2006/relationships" xmlns:p="http://schemas.openxmlformats.org/presentationml/2006/main" showMasterSp="0" type="titleOnly" preserve="1">
   <p:cSld name="Solo el título">
     <p:spTree>
       <p:nvGrpSpPr>
@@ -4071,6 +4021,7 @@
           <a:p>
             <a:fld id="{849D8D26-A748-46E9-A542-215C52EC9E7C}" type="datetimeFigureOut">
               <a:rPr lang="en-US" smtClean="0"/>
+              <a:t>10/4/2019</a:t>
             </a:fld>
             <a:endParaRPr lang="en-US"/>
           </a:p>
@@ -4112,6 +4063,7 @@
           <a:p>
             <a:fld id="{24130969-5BD5-4700-B021-68CBC9F29885}" type="slidenum">
               <a:rPr lang="en-US" smtClean="0"/>
+              <a:t>‹Nº›</a:t>
             </a:fld>
             <a:endParaRPr lang="en-US"/>
           </a:p>
@@ -4122,13 +4074,13 @@
   <p:clrMapOvr>
     <a:masterClrMapping/>
   </p:clrMapOvr>
-  <mc:AlternateContent xmlns:mc="http://schemas.openxmlformats.org/markup-compatibility/2006">
-    <mc:Choice xmlns:p14="http://schemas.microsoft.com/office/powerpoint/2010/main" Requires="p14">
-      <p:transition p14:dur="500">
+  <mc:AlternateContent xmlns:mc="http://schemas.openxmlformats.org/markup-compatibility/2006" xmlns:p14="http://schemas.microsoft.com/office/powerpoint/2010/main">
+    <mc:Choice Requires="p14">
+      <p:transition>
         <p:fade thruBlk="1"/>
       </p:transition>
     </mc:Choice>
-    <mc:Fallback>
+    <mc:Fallback xmlns="">
       <p:transition>
         <p:fade thruBlk="1"/>
       </p:transition>
@@ -4138,7 +4090,7 @@
 </file>
 
 <file path=ppt/slideLayouts/slideLayout7.xml><?xml version="1.0" encoding="utf-8"?>
-<p:sldLayout xmlns:a="http://schemas.openxmlformats.org/drawingml/2006/main" xmlns:r="http://schemas.openxmlformats.org/officeDocument/2006/relationships" xmlns:p="http://schemas.openxmlformats.org/presentationml/2006/main" type="blank" preserve="1" showMasterSp="0">
+<p:sldLayout xmlns:a="http://schemas.openxmlformats.org/drawingml/2006/main" xmlns:r="http://schemas.openxmlformats.org/officeDocument/2006/relationships" xmlns:p="http://schemas.openxmlformats.org/presentationml/2006/main" showMasterSp="0" type="blank" preserve="1">
   <p:cSld name="En blanco">
     <p:spTree>
       <p:nvGrpSpPr>
@@ -4171,6 +4123,7 @@
           <a:p>
             <a:fld id="{849D8D26-A748-46E9-A542-215C52EC9E7C}" type="datetimeFigureOut">
               <a:rPr lang="en-US" smtClean="0"/>
+              <a:t>10/4/2019</a:t>
             </a:fld>
             <a:endParaRPr lang="en-US"/>
           </a:p>
@@ -4212,6 +4165,7 @@
           <a:p>
             <a:fld id="{24130969-5BD5-4700-B021-68CBC9F29885}" type="slidenum">
               <a:rPr lang="en-US" smtClean="0"/>
+              <a:t>‹Nº›</a:t>
             </a:fld>
             <a:endParaRPr lang="en-US"/>
           </a:p>
@@ -4222,13 +4176,13 @@
   <p:clrMapOvr>
     <a:masterClrMapping/>
   </p:clrMapOvr>
-  <mc:AlternateContent xmlns:mc="http://schemas.openxmlformats.org/markup-compatibility/2006">
-    <mc:Choice xmlns:p14="http://schemas.microsoft.com/office/powerpoint/2010/main" Requires="p14">
-      <p:transition p14:dur="500">
+  <mc:AlternateContent xmlns:mc="http://schemas.openxmlformats.org/markup-compatibility/2006" xmlns:p14="http://schemas.microsoft.com/office/powerpoint/2010/main">
+    <mc:Choice Requires="p14">
+      <p:transition>
         <p:fade thruBlk="1"/>
       </p:transition>
     </mc:Choice>
-    <mc:Fallback>
+    <mc:Fallback xmlns="">
       <p:transition>
         <p:fade thruBlk="1"/>
       </p:transition>
@@ -4238,7 +4192,7 @@
 </file>
 
 <file path=ppt/slideLayouts/slideLayout8.xml><?xml version="1.0" encoding="utf-8"?>
-<p:sldLayout xmlns:a="http://schemas.openxmlformats.org/drawingml/2006/main" xmlns:r="http://schemas.openxmlformats.org/officeDocument/2006/relationships" xmlns:p="http://schemas.openxmlformats.org/presentationml/2006/main" type="objTx" preserve="1" showMasterSp="0">
+<p:sldLayout xmlns:a="http://schemas.openxmlformats.org/drawingml/2006/main" xmlns:r="http://schemas.openxmlformats.org/officeDocument/2006/relationships" xmlns:p="http://schemas.openxmlformats.org/presentationml/2006/main" showMasterSp="0" type="objTx" preserve="1">
   <p:cSld name="Contenido con título">
     <p:spTree>
       <p:nvGrpSpPr>
@@ -4315,7 +4269,6 @@
               <a:rPr lang="es-ES" smtClean="0"/>
               <a:t>Haga clic para modificar el estilo de texto del patrón</a:t>
             </a:r>
-            <a:endParaRPr lang="es-ES" smtClean="0"/>
           </a:p>
           <a:p>
             <a:pPr lvl="1"/>
@@ -4323,7 +4276,6 @@
               <a:rPr lang="es-ES" smtClean="0"/>
               <a:t>Segundo nivel</a:t>
             </a:r>
-            <a:endParaRPr lang="es-ES" smtClean="0"/>
           </a:p>
           <a:p>
             <a:pPr lvl="2"/>
@@ -4331,7 +4283,6 @@
               <a:rPr lang="es-ES" smtClean="0"/>
               <a:t>Tercer nivel</a:t>
             </a:r>
-            <a:endParaRPr lang="es-ES" smtClean="0"/>
           </a:p>
           <a:p>
             <a:pPr lvl="3"/>
@@ -4339,7 +4290,6 @@
               <a:rPr lang="es-ES" smtClean="0"/>
               <a:t>Cuarto nivel</a:t>
             </a:r>
-            <a:endParaRPr lang="es-ES" smtClean="0"/>
           </a:p>
           <a:p>
             <a:pPr lvl="4"/>
@@ -4415,7 +4365,6 @@
               <a:rPr lang="es-ES" smtClean="0"/>
               <a:t>Haga clic para modificar el estilo de texto del patrón</a:t>
             </a:r>
-            <a:endParaRPr lang="es-ES" smtClean="0"/>
           </a:p>
         </p:txBody>
       </p:sp>
@@ -4436,6 +4385,7 @@
           <a:p>
             <a:fld id="{849D8D26-A748-46E9-A542-215C52EC9E7C}" type="datetimeFigureOut">
               <a:rPr lang="en-US" smtClean="0"/>
+              <a:t>10/4/2019</a:t>
             </a:fld>
             <a:endParaRPr lang="en-US"/>
           </a:p>
@@ -4477,6 +4427,7 @@
           <a:p>
             <a:fld id="{24130969-5BD5-4700-B021-68CBC9F29885}" type="slidenum">
               <a:rPr lang="en-US" smtClean="0"/>
+              <a:t>‹Nº›</a:t>
             </a:fld>
             <a:endParaRPr lang="en-US"/>
           </a:p>
@@ -4487,13 +4438,13 @@
   <p:clrMapOvr>
     <a:masterClrMapping/>
   </p:clrMapOvr>
-  <mc:AlternateContent xmlns:mc="http://schemas.openxmlformats.org/markup-compatibility/2006">
-    <mc:Choice xmlns:p14="http://schemas.microsoft.com/office/powerpoint/2010/main" Requires="p14">
-      <p:transition p14:dur="500">
+  <mc:AlternateContent xmlns:mc="http://schemas.openxmlformats.org/markup-compatibility/2006" xmlns:p14="http://schemas.microsoft.com/office/powerpoint/2010/main">
+    <mc:Choice Requires="p14">
+      <p:transition>
         <p:fade thruBlk="1"/>
       </p:transition>
     </mc:Choice>
-    <mc:Fallback>
+    <mc:Fallback xmlns="">
       <p:transition>
         <p:fade thruBlk="1"/>
       </p:transition>
@@ -4503,7 +4454,7 @@
 </file>
 
 <file path=ppt/slideLayouts/slideLayout9.xml><?xml version="1.0" encoding="utf-8"?>
-<p:sldLayout xmlns:a="http://schemas.openxmlformats.org/drawingml/2006/main" xmlns:r="http://schemas.openxmlformats.org/officeDocument/2006/relationships" xmlns:p="http://schemas.openxmlformats.org/presentationml/2006/main" type="picTx" preserve="1" showMasterSp="0">
+<p:sldLayout xmlns:a="http://schemas.openxmlformats.org/drawingml/2006/main" xmlns:r="http://schemas.openxmlformats.org/officeDocument/2006/relationships" xmlns:p="http://schemas.openxmlformats.org/presentationml/2006/main" showMasterSp="0" type="picTx" preserve="1">
   <p:cSld name="Imagen con título">
     <p:spTree>
       <p:nvGrpSpPr>
@@ -4684,7 +4635,6 @@
               <a:rPr lang="es-ES" smtClean="0"/>
               <a:t>Haga clic para modificar el estilo de texto del patrón</a:t>
             </a:r>
-            <a:endParaRPr lang="es-ES" smtClean="0"/>
           </a:p>
         </p:txBody>
       </p:sp>
@@ -4705,6 +4655,7 @@
           <a:p>
             <a:fld id="{849D8D26-A748-46E9-A542-215C52EC9E7C}" type="datetimeFigureOut">
               <a:rPr lang="en-US" smtClean="0"/>
+              <a:t>10/4/2019</a:t>
             </a:fld>
             <a:endParaRPr lang="en-US"/>
           </a:p>
@@ -4746,6 +4697,7 @@
           <a:p>
             <a:fld id="{24130969-5BD5-4700-B021-68CBC9F29885}" type="slidenum">
               <a:rPr lang="en-US" smtClean="0"/>
+              <a:t>‹Nº›</a:t>
             </a:fld>
             <a:endParaRPr lang="en-US"/>
           </a:p>
@@ -4756,13 +4708,13 @@
   <p:clrMapOvr>
     <a:masterClrMapping/>
   </p:clrMapOvr>
-  <mc:AlternateContent xmlns:mc="http://schemas.openxmlformats.org/markup-compatibility/2006">
-    <mc:Choice xmlns:p14="http://schemas.microsoft.com/office/powerpoint/2010/main" Requires="p14">
-      <p:transition p14:dur="500">
+  <mc:AlternateContent xmlns:mc="http://schemas.openxmlformats.org/markup-compatibility/2006" xmlns:p14="http://schemas.microsoft.com/office/powerpoint/2010/main">
+    <mc:Choice Requires="p14">
+      <p:transition>
         <p:fade thruBlk="1"/>
       </p:transition>
     </mc:Choice>
-    <mc:Fallback>
+    <mc:Fallback xmlns="">
       <p:transition>
         <p:fade thruBlk="1"/>
       </p:transition>
@@ -4776,12 +4728,17 @@
   <p:cSld>
     <p:bg>
       <p:bgPr>
-        <a:blipFill rotWithShape="0">
-          <a:blip r:embed="rId17"/>
-          <a:stretch>
-            <a:fillRect/>
-          </a:stretch>
-        </a:blipFill>
+        <a:gradFill rotWithShape="0">
+          <a:gsLst>
+            <a:gs pos="0">
+              <a:srgbClr val="14CD68"/>
+            </a:gs>
+            <a:gs pos="100000">
+              <a:srgbClr val="035C7D"/>
+            </a:gs>
+          </a:gsLst>
+          <a:lin scaled="0"/>
+        </a:gradFill>
         <a:effectLst/>
       </p:bgPr>
     </p:bg>
@@ -5394,7 +5351,6 @@
               <a:rPr lang="es-ES" smtClean="0"/>
               <a:t>Haga clic para modificar el estilo de texto del patrón</a:t>
             </a:r>
-            <a:endParaRPr lang="es-ES" smtClean="0"/>
           </a:p>
           <a:p>
             <a:pPr lvl="1"/>
@@ -5402,7 +5358,6 @@
               <a:rPr lang="es-ES" smtClean="0"/>
               <a:t>Segundo nivel</a:t>
             </a:r>
-            <a:endParaRPr lang="es-ES" smtClean="0"/>
           </a:p>
           <a:p>
             <a:pPr lvl="2"/>
@@ -5410,7 +5365,6 @@
               <a:rPr lang="es-ES" smtClean="0"/>
               <a:t>Tercer nivel</a:t>
             </a:r>
-            <a:endParaRPr lang="es-ES" smtClean="0"/>
           </a:p>
           <a:p>
             <a:pPr lvl="3"/>
@@ -5418,7 +5372,6 @@
               <a:rPr lang="es-ES" smtClean="0"/>
               <a:t>Cuarto nivel</a:t>
             </a:r>
-            <a:endParaRPr lang="es-ES" smtClean="0"/>
           </a:p>
           <a:p>
             <a:pPr lvl="4"/>
@@ -5465,6 +5418,7 @@
           <a:p>
             <a:fld id="{849D8D26-A748-46E9-A542-215C52EC9E7C}" type="datetimeFigureOut">
               <a:rPr lang="en-US" smtClean="0"/>
+              <a:t>10/4/2019</a:t>
             </a:fld>
             <a:endParaRPr lang="en-US"/>
           </a:p>
@@ -5540,6 +5494,7 @@
           <a:p>
             <a:fld id="{24130969-5BD5-4700-B021-68CBC9F29885}" type="slidenum">
               <a:rPr lang="en-US" smtClean="0"/>
+              <a:t>‹Nº›</a:t>
             </a:fld>
             <a:endParaRPr lang="en-US"/>
           </a:p>
@@ -5566,13 +5521,13 @@
     <p:sldLayoutId id="2147483663" r:id="rId15"/>
     <p:sldLayoutId id="2147483664" r:id="rId16"/>
   </p:sldLayoutIdLst>
-  <mc:AlternateContent xmlns:mc="http://schemas.openxmlformats.org/markup-compatibility/2006">
-    <mc:Choice xmlns:p14="http://schemas.microsoft.com/office/powerpoint/2010/main" Requires="p14">
-      <p:transition p14:dur="500">
+  <mc:AlternateContent xmlns:mc="http://schemas.openxmlformats.org/markup-compatibility/2006" xmlns:p14="http://schemas.microsoft.com/office/powerpoint/2010/main">
+    <mc:Choice Requires="p14">
+      <p:transition>
         <p:fade thruBlk="1"/>
       </p:transition>
     </mc:Choice>
-    <mc:Fallback>
+    <mc:Fallback xmlns="">
       <p:transition>
         <p:fade thruBlk="1"/>
       </p:transition>
@@ -6012,7 +5967,7 @@
         </p:spPr>
         <p:txBody>
           <a:bodyPr>
-            <a:normAutofit lnSpcReduction="20000"/>
+            <a:normAutofit fontScale="92500"/>
           </a:bodyPr>
           <a:lstStyle/>
           <a:p>
@@ -6029,7 +5984,6 @@
               <a:rPr lang="es-MX" dirty="0" smtClean="0"/>
               <a:t>Juan Enrique Espinoza de los Santos</a:t>
             </a:r>
-            <a:endParaRPr lang="es-MX" dirty="0" smtClean="0"/>
           </a:p>
           <a:p>
             <a:pPr algn="l"/>
@@ -6050,7 +6004,7 @@
           <p:nvPr/>
         </p:nvPicPr>
         <p:blipFill>
-          <a:blip r:embed="rId1"/>
+          <a:blip r:embed="rId2"/>
           <a:srcRect t="32845" b="30294"/>
           <a:stretch>
             <a:fillRect/>
@@ -6312,7 +6266,6 @@
               <a:rPr lang="es-MX" dirty="0" smtClean="0"/>
               <a:t>Juan Daniel Cano Pasillas</a:t>
             </a:r>
-            <a:endParaRPr lang="es-MX" dirty="0" smtClean="0"/>
           </a:p>
           <a:p>
             <a:pPr algn="l"/>
@@ -6320,19 +6273,13 @@
               <a:rPr lang="es-MX" dirty="0" smtClean="0"/>
               <a:t>Juan Gerardo Adame Torres</a:t>
             </a:r>
-            <a:endParaRPr lang="es-MX" dirty="0" smtClean="0"/>
           </a:p>
           <a:p>
             <a:pPr algn="l"/>
             <a:r>
               <a:rPr lang="es-MX" dirty="0" smtClean="0"/>
-              <a:t>Raúl </a:t>
-            </a:r>
-            <a:r>
-              <a:rPr lang="es-MX" dirty="0" smtClean="0"/>
-              <a:t>Alejandro Lira Mesta</a:t>
-            </a:r>
-            <a:endParaRPr lang="es-MX" dirty="0" smtClean="0"/>
+              <a:t>Raúl Alejandro Lira Mesta</a:t>
+            </a:r>
           </a:p>
           <a:p>
             <a:pPr algn="l"/>
@@ -6360,6 +6307,7 @@
           <a:bodyPr wrap="square" rtlCol="0">
             <a:spAutoFit/>
           </a:bodyPr>
+          <a:lstStyle/>
           <a:p>
             <a:pPr algn="ctr"/>
             <a:r>
@@ -6369,10 +6317,6 @@
               </a:rPr>
               <a:t>ANÁLISIS DE USER INTERFACE Y USER EXPERIENCE DE SPOTIFY</a:t>
             </a:r>
-            <a:endParaRPr lang="es-MX" altLang="en-US" sz="4000">
-              <a:latin typeface="Bahnschrift Light SemiCondensed" panose="020B0502040204020203" charset="0"/>
-              <a:cs typeface="Bahnschrift Light SemiCondensed" panose="020B0502040204020203" charset="0"/>
-            </a:endParaRPr>
           </a:p>
         </p:txBody>
       </p:sp>
@@ -6696,9 +6640,9 @@
       </p:par>
     </p:tnLst>
     <p:bldLst>
-      <p:bldP spid="8" grpId="1"/>
       <p:bldP spid="3" grpId="0" uiExpand="1" build="p"/>
       <p:bldP spid="7" grpId="0"/>
+      <p:bldP spid="8" grpId="1"/>
     </p:bldLst>
   </p:timing>
 </p:sld>
@@ -6751,13 +6695,6 @@
               </a:rPr>
               <a:t>Página principal</a:t>
             </a:r>
-            <a:endParaRPr lang="es-MX" u="sng" dirty="0" smtClean="0">
-              <a:solidFill>
-                <a:schemeClr val="tx1"/>
-              </a:solidFill>
-              <a:latin typeface="Bahnschrift Light SemiCondensed" panose="020B0502040204020203" charset="0"/>
-              <a:cs typeface="Bahnschrift Light SemiCondensed" panose="020B0502040204020203" charset="0"/>
-            </a:endParaRPr>
           </a:p>
         </p:txBody>
       </p:sp>
@@ -6772,7 +6709,7 @@
           </p:nvPr>
         </p:nvPicPr>
         <p:blipFill>
-          <a:blip r:embed="rId1" cstate="print">
+          <a:blip r:embed="rId2" cstate="print">
             <a:extLst>
               <a:ext uri="{28A0092B-C50C-407E-A947-70E740481C1C}">
                 <a14:useLocalDpi xmlns:a14="http://schemas.microsoft.com/office/drawing/2010/main" val="0"/>
@@ -6823,7 +6760,6 @@
               <a:rPr lang="es-MX" sz="2000" dirty="0" smtClean="0"/>
               <a:t>Tiene una gamma de colores llamativos y un acceso fácil para crear una cuenta nueva o iniciar una cuenta existente, además de una interfaz limpia.</a:t>
             </a:r>
-            <a:endParaRPr lang="es-MX" sz="2000" dirty="0" smtClean="0"/>
           </a:p>
           <a:p>
             <a:endParaRPr lang="es-MX" sz="2000" dirty="0" smtClean="0"/>
@@ -6911,12 +6847,6 @@
               </a:rPr>
               <a:t>Interfaz</a:t>
             </a:r>
-            <a:endParaRPr lang="es-MX" sz="4000" u="sng" dirty="0" smtClean="0">
-              <a:solidFill>
-                <a:schemeClr val="tx1"/>
-              </a:solidFill>
-              <a:effectLst/>
-            </a:endParaRPr>
           </a:p>
         </p:txBody>
       </p:sp>
@@ -6931,7 +6861,7 @@
           </p:nvPr>
         </p:nvPicPr>
         <p:blipFill>
-          <a:blip r:embed="rId1" cstate="print">
+          <a:blip r:embed="rId2" cstate="print">
             <a:extLst>
               <a:ext uri="{28A0092B-C50C-407E-A947-70E740481C1C}">
                 <a14:useLocalDpi xmlns:a14="http://schemas.microsoft.com/office/drawing/2010/main" val="0"/>
@@ -6982,7 +6912,6 @@
               <a:rPr lang="es-MX" dirty="0" smtClean="0"/>
               <a:t>Cuenta con un inicio fácil de comprender. Los apartados de la parte superior brindan accesos claros y la interfaz muestra recomendaciones acordes.</a:t>
             </a:r>
-            <a:endParaRPr lang="es-MX" dirty="0" smtClean="0"/>
           </a:p>
           <a:p>
             <a:r>
@@ -7041,21 +6970,18 @@
               <a:rPr lang="es-MX" sz="2000" dirty="0" smtClean="0"/>
               <a:t>UX</a:t>
             </a:r>
-            <a:endParaRPr lang="es-MX" sz="2000" dirty="0" smtClean="0"/>
           </a:p>
           <a:p>
             <a:r>
               <a:rPr lang="es-MX" dirty="0" smtClean="0"/>
               <a:t>Brinda fácil acceso a las listas de reproducción personalizadas del usuario y recomendaciones.</a:t>
             </a:r>
-            <a:endParaRPr lang="es-MX" dirty="0" smtClean="0"/>
           </a:p>
           <a:p>
             <a:r>
               <a:rPr lang="es-MX" sz="2000" dirty="0" smtClean="0"/>
               <a:t>UI</a:t>
             </a:r>
-            <a:endParaRPr lang="es-MX" sz="2000" dirty="0" smtClean="0"/>
           </a:p>
           <a:p>
             <a:r>
@@ -7079,7 +7005,7 @@
           <p:nvPr/>
         </p:nvPicPr>
         <p:blipFill>
-          <a:blip r:embed="rId2" cstate="print">
+          <a:blip r:embed="rId3" cstate="print">
             <a:extLst>
               <a:ext uri="{28A0092B-C50C-407E-A947-70E740481C1C}">
                 <a14:useLocalDpi xmlns:a14="http://schemas.microsoft.com/office/drawing/2010/main" val="0"/>
@@ -7165,13 +7091,6 @@
               </a:rPr>
               <a:t>Crear cuenta</a:t>
             </a:r>
-            <a:endParaRPr lang="es-MX" u="sng" dirty="0" smtClean="0">
-              <a:solidFill>
-                <a:schemeClr val="tx1"/>
-              </a:solidFill>
-              <a:latin typeface="Bahnschrift Light SemiCondensed" panose="020B0502040204020203" charset="0"/>
-              <a:cs typeface="Bahnschrift Light SemiCondensed" panose="020B0502040204020203" charset="0"/>
-            </a:endParaRPr>
           </a:p>
         </p:txBody>
       </p:sp>
@@ -7186,7 +7105,7 @@
           </p:nvPr>
         </p:nvPicPr>
         <p:blipFill rotWithShape="1">
-          <a:blip r:embed="rId1" cstate="print">
+          <a:blip r:embed="rId2" cstate="print">
             <a:extLst>
               <a:ext uri="{28A0092B-C50C-407E-A947-70E740481C1C}">
                 <a14:useLocalDpi xmlns:a14="http://schemas.microsoft.com/office/drawing/2010/main" val="0"/>
@@ -7246,7 +7165,6 @@
               <a:rPr lang="es-MX" dirty="0" smtClean="0"/>
               <a:t> de una cuenta de Facebook.</a:t>
             </a:r>
-            <a:endParaRPr lang="es-MX" dirty="0" smtClean="0"/>
           </a:p>
           <a:p>
             <a:endParaRPr lang="es-MX" dirty="0" smtClean="0"/>
@@ -7349,13 +7267,6 @@
               </a:rPr>
               <a:t>Inicio de sesión</a:t>
             </a:r>
-            <a:endParaRPr lang="es-MX" u="sng" dirty="0" smtClean="0">
-              <a:solidFill>
-                <a:schemeClr val="tx1"/>
-              </a:solidFill>
-              <a:latin typeface="Bahnschrift Light SemiCondensed" panose="020B0502040204020203" charset="0"/>
-              <a:cs typeface="Bahnschrift Light SemiCondensed" panose="020B0502040204020203" charset="0"/>
-            </a:endParaRPr>
           </a:p>
         </p:txBody>
       </p:sp>
@@ -7370,7 +7281,7 @@
           </p:nvPr>
         </p:nvPicPr>
         <p:blipFill>
-          <a:blip r:embed="rId1">
+          <a:blip r:embed="rId2">
             <a:extLst>
               <a:ext uri="{28A0092B-C50C-407E-A947-70E740481C1C}">
                 <a14:useLocalDpi xmlns:a14="http://schemas.microsoft.com/office/drawing/2010/main" val="0"/>
@@ -7414,7 +7325,6 @@
               <a:rPr lang="es-MX" sz="2000" dirty="0" smtClean="0"/>
               <a:t>UX</a:t>
             </a:r>
-            <a:endParaRPr lang="es-MX" sz="2000" dirty="0" smtClean="0"/>
           </a:p>
           <a:p>
             <a:r>
@@ -7425,7 +7335,6 @@
               <a:rPr lang="es-MX" dirty="0" smtClean="0"/>
               <a:t>encillo inicio de sesión con alternativa a iniciar sesión con una cuenta Facebook.</a:t>
             </a:r>
-            <a:endParaRPr lang="es-MX" dirty="0" smtClean="0"/>
           </a:p>
           <a:p>
             <a:endParaRPr lang="es-MX" dirty="0" smtClean="0"/>
@@ -7435,7 +7344,6 @@
               <a:rPr lang="es-MX" sz="2000" dirty="0" smtClean="0"/>
               <a:t>UI</a:t>
             </a:r>
-            <a:endParaRPr lang="es-MX" sz="2000" dirty="0" smtClean="0"/>
           </a:p>
           <a:p>
             <a:r>
@@ -7446,7 +7354,6 @@
               <a:rPr lang="es-MX" dirty="0" smtClean="0"/>
               <a:t>on un solo botón se inicia sesión desde Facebook o solo introduciendo usuario y contraseña para iniciar, también un botón en caso de no contar con una cuenta existente.</a:t>
             </a:r>
-            <a:endParaRPr lang="es-MX" dirty="0" smtClean="0"/>
           </a:p>
           <a:p>
             <a:endParaRPr lang="es-MX" dirty="0"/>
@@ -7517,25 +7424,8 @@
                 <a:latin typeface="Bahnschrift Light SemiCondensed" panose="020B0502040204020203" charset="0"/>
                 <a:cs typeface="Bahnschrift Light SemiCondensed" panose="020B0502040204020203" charset="0"/>
               </a:rPr>
-              <a:t>Reproductor de </a:t>
-            </a:r>
-            <a:r>
-              <a:rPr lang="es-MX" u="sng" dirty="0" err="1" smtClean="0">
-                <a:solidFill>
-                  <a:schemeClr val="tx1"/>
-                </a:solidFill>
-                <a:latin typeface="Bahnschrift Light SemiCondensed" panose="020B0502040204020203" charset="0"/>
-                <a:cs typeface="Bahnschrift Light SemiCondensed" panose="020B0502040204020203" charset="0"/>
-              </a:rPr>
-              <a:t>música</a:t>
-            </a:r>
-            <a:endParaRPr lang="es-MX" u="sng" dirty="0" err="1" smtClean="0">
-              <a:solidFill>
-                <a:schemeClr val="tx1"/>
-              </a:solidFill>
-              <a:latin typeface="Bahnschrift Light SemiCondensed" panose="020B0502040204020203" charset="0"/>
-              <a:cs typeface="Bahnschrift Light SemiCondensed" panose="020B0502040204020203" charset="0"/>
-            </a:endParaRPr>
+              <a:t>Reproductor de música</a:t>
+            </a:r>
           </a:p>
         </p:txBody>
       </p:sp>
@@ -7550,7 +7440,7 @@
           </p:nvPr>
         </p:nvPicPr>
         <p:blipFill>
-          <a:blip r:embed="rId1">
+          <a:blip r:embed="rId2">
             <a:extLst>
               <a:ext uri="{28A0092B-C50C-407E-A947-70E740481C1C}">
                 <a14:useLocalDpi xmlns:a14="http://schemas.microsoft.com/office/drawing/2010/main" val="0"/>
@@ -7598,12 +7488,12 @@
           </a:p>
           <a:p>
             <a:r>
-              <a:rPr lang="es-MX" dirty="0" err="1" smtClean="0"/>
-              <a:t>Funcinamiento</a:t>
-            </a:r>
-            <a:r>
               <a:rPr lang="es-MX" dirty="0" smtClean="0"/>
-              <a:t> muy intuitivo para seleccionar y reproducir cualquier canción, y el reproductor esta visible en todo momento.</a:t>
+              <a:t>Funcionamiento </a:t>
+            </a:r>
+            <a:r>
+              <a:rPr lang="es-MX" dirty="0" smtClean="0"/>
+              <a:t>muy intuitivo para seleccionar y reproducir cualquier canción, y el reproductor esta visible en todo momento.</a:t>
             </a:r>
             <a:endParaRPr lang="es-MX" dirty="0"/>
           </a:p>
@@ -7629,6 +7519,7 @@
           <a:bodyPr wrap="square" rtlCol="0">
             <a:spAutoFit/>
           </a:bodyPr>
+          <a:lstStyle/>
           <a:p>
             <a:r>
               <a:rPr lang="es-MX" sz="2000" dirty="0" smtClean="0"/>
@@ -7718,13 +7609,6 @@
               </a:rPr>
               <a:t>Buscador</a:t>
             </a:r>
-            <a:endParaRPr lang="es-MX" u="sng" dirty="0" smtClean="0">
-              <a:solidFill>
-                <a:schemeClr val="tx1"/>
-              </a:solidFill>
-              <a:latin typeface="Bahnschrift Light SemiCondensed" panose="020B0502040204020203" charset="0"/>
-              <a:cs typeface="Bahnschrift Light SemiCondensed" panose="020B0502040204020203" charset="0"/>
-            </a:endParaRPr>
           </a:p>
         </p:txBody>
       </p:sp>
@@ -7739,7 +7623,7 @@
           </p:nvPr>
         </p:nvPicPr>
         <p:blipFill>
-          <a:blip r:embed="rId1" cstate="print">
+          <a:blip r:embed="rId2" cstate="print">
             <a:extLst>
               <a:ext uri="{28A0092B-C50C-407E-A947-70E740481C1C}">
                 <a14:useLocalDpi xmlns:a14="http://schemas.microsoft.com/office/drawing/2010/main" val="0"/>
@@ -7766,7 +7650,7 @@
           <p:nvPr/>
         </p:nvPicPr>
         <p:blipFill>
-          <a:blip r:embed="rId2" cstate="print">
+          <a:blip r:embed="rId3" cstate="print">
             <a:extLst>
               <a:ext uri="{28A0092B-C50C-407E-A947-70E740481C1C}">
                 <a14:useLocalDpi xmlns:a14="http://schemas.microsoft.com/office/drawing/2010/main" val="0"/>
@@ -7820,14 +7704,12 @@
               <a:rPr lang="es-MX" dirty="0" smtClean="0"/>
               <a:t>Un buscador muy básico y nada complicado para solo empezar a buscar canciones o artistas</a:t>
             </a:r>
-            <a:endParaRPr lang="es-MX" dirty="0" smtClean="0"/>
           </a:p>
           <a:p>
             <a:r>
               <a:rPr lang="es-MX" sz="2000" dirty="0" smtClean="0"/>
               <a:t>UI</a:t>
             </a:r>
-            <a:endParaRPr lang="es-MX" sz="2000" dirty="0" smtClean="0"/>
           </a:p>
           <a:p>
             <a:r>
@@ -7868,7 +7750,6 @@
               <a:rPr lang="es-MX" sz="2000" dirty="0" smtClean="0"/>
               <a:t>UX</a:t>
             </a:r>
-            <a:endParaRPr lang="es-MX" sz="2000" dirty="0" smtClean="0"/>
           </a:p>
           <a:p>
             <a:r>
@@ -7879,14 +7760,12 @@
               <a:rPr lang="es-MX" dirty="0" smtClean="0"/>
               <a:t>espuesta en caso de no encontrar nada parecido a la búsqueda solicitada</a:t>
             </a:r>
-            <a:endParaRPr lang="es-MX" dirty="0" smtClean="0"/>
           </a:p>
           <a:p>
             <a:r>
               <a:rPr lang="es-MX" sz="2000" dirty="0" smtClean="0"/>
               <a:t>UI</a:t>
             </a:r>
-            <a:endParaRPr lang="es-MX" sz="2000" dirty="0" smtClean="0"/>
           </a:p>
           <a:p>
             <a:r>
@@ -8166,6 +8045,8 @@
       </a:bgFillStyleLst>
     </a:fmtScheme>
   </a:themeElements>
+  <a:objectDefaults/>
+  <a:extraClrSchemeLst/>
   <a:extLst>
     <a:ext uri="{05A4C25C-085E-4340-85A3-A5531E510DB2}">
       <thm15:themeFamily xmlns:thm15="http://schemas.microsoft.com/office/thememl/2012/main" name="Office Theme" id="{62F939B6-93AF-4DB8-9C6B-D6C7DFDC589F}" vid="{4A3C46E8-61CC-4603-A589-7422A47A8E4A}"/>

</xml_diff>